<commit_message>
rename abparser to battleshipparser
</commit_message>
<xml_diff>
--- a/docs/diagrams/StatsSequenceDiagram.pptx
+++ b/docs/diagrams/StatsSequenceDiagram.pptx
@@ -208,7 +208,7 @@
           <a:p>
             <a:fld id="{F5CC4B3F-88C1-4FFA-B1B6-F41C21DC6924}" type="datetimeFigureOut">
               <a:rPr lang="en-US" smtClean="0"/>
-              <a:t>4/13/2019</a:t>
+              <a:t>4/15/2019</a:t>
             </a:fld>
             <a:endParaRPr lang="en-US"/>
           </a:p>
@@ -755,7 +755,7 @@
           <a:p>
             <a:fld id="{78C97017-6FC3-485B-9764-EAC9E56C1D49}" type="datetimeFigureOut">
               <a:rPr lang="en-US" smtClean="0"/>
-              <a:t>4/13/2019</a:t>
+              <a:t>4/15/2019</a:t>
             </a:fld>
             <a:endParaRPr lang="en-US"/>
           </a:p>
@@ -923,7 +923,7 @@
           <a:p>
             <a:fld id="{78C97017-6FC3-485B-9764-EAC9E56C1D49}" type="datetimeFigureOut">
               <a:rPr lang="en-US" smtClean="0"/>
-              <a:t>4/13/2019</a:t>
+              <a:t>4/15/2019</a:t>
             </a:fld>
             <a:endParaRPr lang="en-US"/>
           </a:p>
@@ -1101,7 +1101,7 @@
           <a:p>
             <a:fld id="{78C97017-6FC3-485B-9764-EAC9E56C1D49}" type="datetimeFigureOut">
               <a:rPr lang="en-US" smtClean="0"/>
-              <a:t>4/13/2019</a:t>
+              <a:t>4/15/2019</a:t>
             </a:fld>
             <a:endParaRPr lang="en-US"/>
           </a:p>
@@ -1269,7 +1269,7 @@
           <a:p>
             <a:fld id="{78C97017-6FC3-485B-9764-EAC9E56C1D49}" type="datetimeFigureOut">
               <a:rPr lang="en-US" smtClean="0"/>
-              <a:t>4/13/2019</a:t>
+              <a:t>4/15/2019</a:t>
             </a:fld>
             <a:endParaRPr lang="en-US"/>
           </a:p>
@@ -1514,7 +1514,7 @@
           <a:p>
             <a:fld id="{78C97017-6FC3-485B-9764-EAC9E56C1D49}" type="datetimeFigureOut">
               <a:rPr lang="en-US" smtClean="0"/>
-              <a:t>4/13/2019</a:t>
+              <a:t>4/15/2019</a:t>
             </a:fld>
             <a:endParaRPr lang="en-US"/>
           </a:p>
@@ -1799,7 +1799,7 @@
           <a:p>
             <a:fld id="{78C97017-6FC3-485B-9764-EAC9E56C1D49}" type="datetimeFigureOut">
               <a:rPr lang="en-US" smtClean="0"/>
-              <a:t>4/13/2019</a:t>
+              <a:t>4/15/2019</a:t>
             </a:fld>
             <a:endParaRPr lang="en-US"/>
           </a:p>
@@ -2218,7 +2218,7 @@
           <a:p>
             <a:fld id="{78C97017-6FC3-485B-9764-EAC9E56C1D49}" type="datetimeFigureOut">
               <a:rPr lang="en-US" smtClean="0"/>
-              <a:t>4/13/2019</a:t>
+              <a:t>4/15/2019</a:t>
             </a:fld>
             <a:endParaRPr lang="en-US"/>
           </a:p>
@@ -2335,7 +2335,7 @@
           <a:p>
             <a:fld id="{78C97017-6FC3-485B-9764-EAC9E56C1D49}" type="datetimeFigureOut">
               <a:rPr lang="en-US" smtClean="0"/>
-              <a:t>4/13/2019</a:t>
+              <a:t>4/15/2019</a:t>
             </a:fld>
             <a:endParaRPr lang="en-US"/>
           </a:p>
@@ -2430,7 +2430,7 @@
           <a:p>
             <a:fld id="{78C97017-6FC3-485B-9764-EAC9E56C1D49}" type="datetimeFigureOut">
               <a:rPr lang="en-US" smtClean="0"/>
-              <a:t>4/13/2019</a:t>
+              <a:t>4/15/2019</a:t>
             </a:fld>
             <a:endParaRPr lang="en-US"/>
           </a:p>
@@ -2705,7 +2705,7 @@
           <a:p>
             <a:fld id="{78C97017-6FC3-485B-9764-EAC9E56C1D49}" type="datetimeFigureOut">
               <a:rPr lang="en-US" smtClean="0"/>
-              <a:t>4/13/2019</a:t>
+              <a:t>4/15/2019</a:t>
             </a:fld>
             <a:endParaRPr lang="en-US"/>
           </a:p>
@@ -2957,7 +2957,7 @@
           <a:p>
             <a:fld id="{78C97017-6FC3-485B-9764-EAC9E56C1D49}" type="datetimeFigureOut">
               <a:rPr lang="en-US" smtClean="0"/>
-              <a:t>4/13/2019</a:t>
+              <a:t>4/15/2019</a:t>
             </a:fld>
             <a:endParaRPr lang="en-US"/>
           </a:p>
@@ -3168,7 +3168,7 @@
           <a:p>
             <a:fld id="{78C97017-6FC3-485B-9764-EAC9E56C1D49}" type="datetimeFigureOut">
               <a:rPr lang="en-US" smtClean="0"/>
-              <a:t>4/13/2019</a:t>
+              <a:t>4/15/2019</a:t>
             </a:fld>
             <a:endParaRPr lang="en-US"/>
           </a:p>
@@ -3925,37 +3925,32 @@
           <a:p>
             <a:pPr algn="ctr"/>
             <a:r>
-              <a:rPr lang="en-US" sz="1600" dirty="0">
+              <a:rPr lang="en-US" sz="1600">
                 <a:solidFill>
                   <a:schemeClr val="bg1"/>
                 </a:solidFill>
-                <a:highlight>
-                  <a:srgbClr val="FF0000"/>
-                </a:highlight>
               </a:rPr>
-              <a:t>:Address</a:t>
-            </a:r>
-          </a:p>
-          <a:p>
-            <a:pPr algn="ctr"/>
-            <a:r>
-              <a:rPr lang="en-US" sz="1600" dirty="0">
+              <a:t>:Battleship</a:t>
+            </a:r>
+            <a:br>
+              <a:rPr lang="en-US" sz="1600">
                 <a:solidFill>
                   <a:schemeClr val="bg1"/>
                 </a:solidFill>
-                <a:highlight>
-                  <a:srgbClr val="FF0000"/>
-                </a:highlight>
               </a:rPr>
-              <a:t>BookParser</a:t>
+            </a:br>
+            <a:r>
+              <a:rPr lang="en-US" sz="1600">
+                <a:solidFill>
+                  <a:schemeClr val="bg1"/>
+                </a:solidFill>
+              </a:rPr>
+              <a:t>Parser</a:t>
             </a:r>
             <a:endParaRPr lang="en-SG" sz="1600" dirty="0">
               <a:solidFill>
                 <a:schemeClr val="bg1"/>
               </a:solidFill>
-              <a:highlight>
-                <a:srgbClr val="FF0000"/>
-              </a:highlight>
             </a:endParaRPr>
           </a:p>
         </p:txBody>

</xml_diff>